<commit_message>
Add Gantt PM Diagramm + JS Bib for this Stuff
</commit_message>
<xml_diff>
--- a/documents/projectmanagement/Allgemeines/Kennzahlenmodell.pptx
+++ b/documents/projectmanagement/Allgemeines/Kennzahlenmodell.pptx
@@ -12,6 +12,8 @@
     <p:sldId id="260" r:id="rId6"/>
     <p:sldId id="261" r:id="rId7"/>
     <p:sldId id="262" r:id="rId8"/>
+    <p:sldId id="263" r:id="rId9"/>
+    <p:sldId id="264" r:id="rId10"/>
   </p:sldIdLst>
   <p:sldSz cx="12192000" cy="6858000"/>
   <p:notesSz cx="6858000" cy="9144000"/>
@@ -5892,7 +5894,7 @@
           <a:p>
             <a:fld id="{04DB4664-320F-496D-9F7E-954AAC8184AA}" type="datetimeFigureOut">
               <a:rPr lang="de-DE" smtClean="0"/>
-              <a:t>14.07.2016</a:t>
+              <a:t>18.07.2016</a:t>
             </a:fld>
             <a:endParaRPr lang="de-DE"/>
           </a:p>
@@ -6060,7 +6062,7 @@
           <a:p>
             <a:fld id="{04DB4664-320F-496D-9F7E-954AAC8184AA}" type="datetimeFigureOut">
               <a:rPr lang="de-DE" smtClean="0"/>
-              <a:t>14.07.2016</a:t>
+              <a:t>18.07.2016</a:t>
             </a:fld>
             <a:endParaRPr lang="de-DE"/>
           </a:p>
@@ -6238,7 +6240,7 @@
           <a:p>
             <a:fld id="{04DB4664-320F-496D-9F7E-954AAC8184AA}" type="datetimeFigureOut">
               <a:rPr lang="de-DE" smtClean="0"/>
-              <a:t>14.07.2016</a:t>
+              <a:t>18.07.2016</a:t>
             </a:fld>
             <a:endParaRPr lang="de-DE"/>
           </a:p>
@@ -6406,7 +6408,7 @@
           <a:p>
             <a:fld id="{04DB4664-320F-496D-9F7E-954AAC8184AA}" type="datetimeFigureOut">
               <a:rPr lang="de-DE" smtClean="0"/>
-              <a:t>14.07.2016</a:t>
+              <a:t>18.07.2016</a:t>
             </a:fld>
             <a:endParaRPr lang="de-DE"/>
           </a:p>
@@ -6651,7 +6653,7 @@
           <a:p>
             <a:fld id="{04DB4664-320F-496D-9F7E-954AAC8184AA}" type="datetimeFigureOut">
               <a:rPr lang="de-DE" smtClean="0"/>
-              <a:t>14.07.2016</a:t>
+              <a:t>18.07.2016</a:t>
             </a:fld>
             <a:endParaRPr lang="de-DE"/>
           </a:p>
@@ -6880,7 +6882,7 @@
           <a:p>
             <a:fld id="{04DB4664-320F-496D-9F7E-954AAC8184AA}" type="datetimeFigureOut">
               <a:rPr lang="de-DE" smtClean="0"/>
-              <a:t>14.07.2016</a:t>
+              <a:t>18.07.2016</a:t>
             </a:fld>
             <a:endParaRPr lang="de-DE"/>
           </a:p>
@@ -7244,7 +7246,7 @@
           <a:p>
             <a:fld id="{04DB4664-320F-496D-9F7E-954AAC8184AA}" type="datetimeFigureOut">
               <a:rPr lang="de-DE" smtClean="0"/>
-              <a:t>14.07.2016</a:t>
+              <a:t>18.07.2016</a:t>
             </a:fld>
             <a:endParaRPr lang="de-DE"/>
           </a:p>
@@ -7361,7 +7363,7 @@
           <a:p>
             <a:fld id="{04DB4664-320F-496D-9F7E-954AAC8184AA}" type="datetimeFigureOut">
               <a:rPr lang="de-DE" smtClean="0"/>
-              <a:t>14.07.2016</a:t>
+              <a:t>18.07.2016</a:t>
             </a:fld>
             <a:endParaRPr lang="de-DE"/>
           </a:p>
@@ -7456,7 +7458,7 @@
           <a:p>
             <a:fld id="{04DB4664-320F-496D-9F7E-954AAC8184AA}" type="datetimeFigureOut">
               <a:rPr lang="de-DE" smtClean="0"/>
-              <a:t>14.07.2016</a:t>
+              <a:t>18.07.2016</a:t>
             </a:fld>
             <a:endParaRPr lang="de-DE"/>
           </a:p>
@@ -7731,7 +7733,7 @@
           <a:p>
             <a:fld id="{04DB4664-320F-496D-9F7E-954AAC8184AA}" type="datetimeFigureOut">
               <a:rPr lang="de-DE" smtClean="0"/>
-              <a:t>14.07.2016</a:t>
+              <a:t>18.07.2016</a:t>
             </a:fld>
             <a:endParaRPr lang="de-DE"/>
           </a:p>
@@ -7983,7 +7985,7 @@
           <a:p>
             <a:fld id="{04DB4664-320F-496D-9F7E-954AAC8184AA}" type="datetimeFigureOut">
               <a:rPr lang="de-DE" smtClean="0"/>
-              <a:t>14.07.2016</a:t>
+              <a:t>18.07.2016</a:t>
             </a:fld>
             <a:endParaRPr lang="de-DE"/>
           </a:p>
@@ -8194,7 +8196,7 @@
           <a:p>
             <a:fld id="{04DB4664-320F-496D-9F7E-954AAC8184AA}" type="datetimeFigureOut">
               <a:rPr lang="de-DE" smtClean="0"/>
-              <a:t>14.07.2016</a:t>
+              <a:t>18.07.2016</a:t>
             </a:fld>
             <a:endParaRPr lang="de-DE"/>
           </a:p>
@@ -9411,6 +9413,219 @@
 </p:sld>
 </file>
 
+<file path=ppt/slides/slide8.xml><?xml version="1.0" encoding="utf-8"?>
+<p:sld xmlns:a="http://schemas.openxmlformats.org/drawingml/2006/main" xmlns:r="http://schemas.openxmlformats.org/officeDocument/2006/relationships" xmlns:p="http://schemas.openxmlformats.org/presentationml/2006/main">
+  <p:cSld>
+    <p:spTree>
+      <p:nvGrpSpPr>
+        <p:cNvPr id="1" name=""/>
+        <p:cNvGrpSpPr/>
+        <p:nvPr/>
+      </p:nvGrpSpPr>
+      <p:grpSpPr>
+        <a:xfrm>
+          <a:off x="0" y="0"/>
+          <a:ext cx="0" cy="0"/>
+          <a:chOff x="0" y="0"/>
+          <a:chExt cx="0" cy="0"/>
+        </a:xfrm>
+      </p:grpSpPr>
+      <p:sp>
+        <p:nvSpPr>
+          <p:cNvPr id="2" name="Titel 1"/>
+          <p:cNvSpPr>
+            <a:spLocks noGrp="1"/>
+          </p:cNvSpPr>
+          <p:nvPr>
+            <p:ph type="title"/>
+          </p:nvPr>
+        </p:nvSpPr>
+        <p:spPr/>
+        <p:txBody>
+          <a:bodyPr/>
+          <a:lstStyle/>
+          <a:p>
+            <a:r>
+              <a:rPr lang="de-DE" dirty="0"/>
+              <a:t>Kennzahlen Mitarbeiter</a:t>
+            </a:r>
+          </a:p>
+        </p:txBody>
+      </p:sp>
+      <p:sp>
+        <p:nvSpPr>
+          <p:cNvPr id="3" name="Inhaltsplatzhalter 2"/>
+          <p:cNvSpPr>
+            <a:spLocks noGrp="1"/>
+          </p:cNvSpPr>
+          <p:nvPr>
+            <p:ph idx="1"/>
+          </p:nvPr>
+        </p:nvSpPr>
+        <p:spPr/>
+        <p:txBody>
+          <a:bodyPr/>
+          <a:lstStyle/>
+          <a:p>
+            <a:r>
+              <a:rPr lang="de-DE" dirty="0"/>
+              <a:t>Verplante Mitarbeiter -&gt; Zu freien Mitarbeitern</a:t>
+            </a:r>
+          </a:p>
+          <a:p>
+            <a:pPr lvl="1"/>
+            <a:r>
+              <a:rPr lang="de-DE" dirty="0"/>
+              <a:t>Wer ist für welches Projekt frei</a:t>
+            </a:r>
+          </a:p>
+          <a:p>
+            <a:pPr lvl="1"/>
+            <a:r>
+              <a:rPr lang="de-DE" dirty="0"/>
+              <a:t>Oder Stundenbasis</a:t>
+            </a:r>
+          </a:p>
+          <a:p>
+            <a:r>
+              <a:rPr lang="de-DE" dirty="0"/>
+              <a:t>Verplante Projektleiter</a:t>
+            </a:r>
+          </a:p>
+          <a:p>
+            <a:pPr lvl="1"/>
+            <a:r>
+              <a:rPr lang="de-DE" dirty="0"/>
+              <a:t>Oder auf Stundenbasis</a:t>
+            </a:r>
+          </a:p>
+          <a:p>
+            <a:pPr lvl="1"/>
+            <a:r>
+              <a:rPr lang="de-DE" dirty="0"/>
+              <a:t>Können nicht mehrere Projekte annehmen</a:t>
+            </a:r>
+          </a:p>
+        </p:txBody>
+      </p:sp>
+    </p:spTree>
+    <p:extLst>
+      <p:ext uri="{BB962C8B-B14F-4D97-AF65-F5344CB8AC3E}">
+        <p14:creationId xmlns:p14="http://schemas.microsoft.com/office/powerpoint/2010/main" val="631412914"/>
+      </p:ext>
+    </p:extLst>
+  </p:cSld>
+  <p:clrMapOvr>
+    <a:masterClrMapping/>
+  </p:clrMapOvr>
+</p:sld>
+</file>
+
+<file path=ppt/slides/slide9.xml><?xml version="1.0" encoding="utf-8"?>
+<p:sld xmlns:a="http://schemas.openxmlformats.org/drawingml/2006/main" xmlns:r="http://schemas.openxmlformats.org/officeDocument/2006/relationships" xmlns:p="http://schemas.openxmlformats.org/presentationml/2006/main">
+  <p:cSld>
+    <p:spTree>
+      <p:nvGrpSpPr>
+        <p:cNvPr id="1" name=""/>
+        <p:cNvGrpSpPr/>
+        <p:nvPr/>
+      </p:nvGrpSpPr>
+      <p:grpSpPr>
+        <a:xfrm>
+          <a:off x="0" y="0"/>
+          <a:ext cx="0" cy="0"/>
+          <a:chOff x="0" y="0"/>
+          <a:chExt cx="0" cy="0"/>
+        </a:xfrm>
+      </p:grpSpPr>
+      <p:sp>
+        <p:nvSpPr>
+          <p:cNvPr id="2" name="Titel 1"/>
+          <p:cNvSpPr>
+            <a:spLocks noGrp="1"/>
+          </p:cNvSpPr>
+          <p:nvPr>
+            <p:ph type="title"/>
+          </p:nvPr>
+        </p:nvSpPr>
+        <p:spPr/>
+        <p:txBody>
+          <a:bodyPr/>
+          <a:lstStyle/>
+          <a:p>
+            <a:r>
+              <a:rPr lang="de-DE" dirty="0"/>
+              <a:t>Kennzahlen Zeit</a:t>
+            </a:r>
+          </a:p>
+        </p:txBody>
+      </p:sp>
+      <p:sp>
+        <p:nvSpPr>
+          <p:cNvPr id="3" name="Inhaltsplatzhalter 2"/>
+          <p:cNvSpPr>
+            <a:spLocks noGrp="1"/>
+          </p:cNvSpPr>
+          <p:nvPr>
+            <p:ph idx="1"/>
+          </p:nvPr>
+        </p:nvSpPr>
+        <p:spPr/>
+        <p:txBody>
+          <a:bodyPr/>
+          <a:lstStyle/>
+          <a:p>
+            <a:r>
+              <a:rPr lang="de-DE" dirty="0"/>
+              <a:t>Kalkulierte Startzeit zu kalkulierte Endzeit</a:t>
+            </a:r>
+          </a:p>
+          <a:p>
+            <a:pPr lvl="1"/>
+            <a:r>
+              <a:rPr lang="de-DE" dirty="0"/>
+              <a:t>Tatsächliche Zeit + Verschiebung</a:t>
+            </a:r>
+          </a:p>
+          <a:p>
+            <a:pPr lvl="1"/>
+            <a:endParaRPr lang="de-DE" dirty="0"/>
+          </a:p>
+          <a:p>
+            <a:r>
+              <a:rPr lang="de-DE" dirty="0"/>
+              <a:t>Projektplananzeige</a:t>
+            </a:r>
+          </a:p>
+          <a:p>
+            <a:pPr lvl="1"/>
+            <a:r>
+              <a:rPr lang="de-DE" dirty="0"/>
+              <a:t>Gantt Diagramm mit laufenden Projekten?</a:t>
+            </a:r>
+          </a:p>
+          <a:p>
+            <a:pPr lvl="1"/>
+            <a:r>
+              <a:rPr lang="de-DE" dirty="0"/>
+              <a:t>Gantt Diagramm mit offenen Projekten und ihrer kalkulierten Zeit</a:t>
+            </a:r>
+          </a:p>
+        </p:txBody>
+      </p:sp>
+    </p:spTree>
+    <p:extLst>
+      <p:ext uri="{BB962C8B-B14F-4D97-AF65-F5344CB8AC3E}">
+        <p14:creationId xmlns:p14="http://schemas.microsoft.com/office/powerpoint/2010/main" val="2635190172"/>
+      </p:ext>
+    </p:extLst>
+  </p:cSld>
+  <p:clrMapOvr>
+    <a:masterClrMapping/>
+  </p:clrMapOvr>
+</p:sld>
+</file>
+
 <file path=ppt/theme/theme1.xml><?xml version="1.0" encoding="utf-8"?>
 <a:theme xmlns:a="http://schemas.openxmlformats.org/drawingml/2006/main" name="Office">
   <a:themeElements>

</xml_diff>

<commit_message>
Change Structure and adding new Presentations ...
</commit_message>
<xml_diff>
--- a/documents/projectmanagement/Allgemeines/Kennzahlenmodell.pptx
+++ b/documents/projectmanagement/Allgemeines/Kennzahlenmodell.pptx
@@ -5894,7 +5894,7 @@
           <a:p>
             <a:fld id="{04DB4664-320F-496D-9F7E-954AAC8184AA}" type="datetimeFigureOut">
               <a:rPr lang="de-DE" smtClean="0"/>
-              <a:t>18.07.2016</a:t>
+              <a:t>25.07.2016</a:t>
             </a:fld>
             <a:endParaRPr lang="de-DE"/>
           </a:p>
@@ -6062,7 +6062,7 @@
           <a:p>
             <a:fld id="{04DB4664-320F-496D-9F7E-954AAC8184AA}" type="datetimeFigureOut">
               <a:rPr lang="de-DE" smtClean="0"/>
-              <a:t>18.07.2016</a:t>
+              <a:t>25.07.2016</a:t>
             </a:fld>
             <a:endParaRPr lang="de-DE"/>
           </a:p>
@@ -6240,7 +6240,7 @@
           <a:p>
             <a:fld id="{04DB4664-320F-496D-9F7E-954AAC8184AA}" type="datetimeFigureOut">
               <a:rPr lang="de-DE" smtClean="0"/>
-              <a:t>18.07.2016</a:t>
+              <a:t>25.07.2016</a:t>
             </a:fld>
             <a:endParaRPr lang="de-DE"/>
           </a:p>
@@ -6408,7 +6408,7 @@
           <a:p>
             <a:fld id="{04DB4664-320F-496D-9F7E-954AAC8184AA}" type="datetimeFigureOut">
               <a:rPr lang="de-DE" smtClean="0"/>
-              <a:t>18.07.2016</a:t>
+              <a:t>25.07.2016</a:t>
             </a:fld>
             <a:endParaRPr lang="de-DE"/>
           </a:p>
@@ -6653,7 +6653,7 @@
           <a:p>
             <a:fld id="{04DB4664-320F-496D-9F7E-954AAC8184AA}" type="datetimeFigureOut">
               <a:rPr lang="de-DE" smtClean="0"/>
-              <a:t>18.07.2016</a:t>
+              <a:t>25.07.2016</a:t>
             </a:fld>
             <a:endParaRPr lang="de-DE"/>
           </a:p>
@@ -6882,7 +6882,7 @@
           <a:p>
             <a:fld id="{04DB4664-320F-496D-9F7E-954AAC8184AA}" type="datetimeFigureOut">
               <a:rPr lang="de-DE" smtClean="0"/>
-              <a:t>18.07.2016</a:t>
+              <a:t>25.07.2016</a:t>
             </a:fld>
             <a:endParaRPr lang="de-DE"/>
           </a:p>
@@ -7246,7 +7246,7 @@
           <a:p>
             <a:fld id="{04DB4664-320F-496D-9F7E-954AAC8184AA}" type="datetimeFigureOut">
               <a:rPr lang="de-DE" smtClean="0"/>
-              <a:t>18.07.2016</a:t>
+              <a:t>25.07.2016</a:t>
             </a:fld>
             <a:endParaRPr lang="de-DE"/>
           </a:p>
@@ -7363,7 +7363,7 @@
           <a:p>
             <a:fld id="{04DB4664-320F-496D-9F7E-954AAC8184AA}" type="datetimeFigureOut">
               <a:rPr lang="de-DE" smtClean="0"/>
-              <a:t>18.07.2016</a:t>
+              <a:t>25.07.2016</a:t>
             </a:fld>
             <a:endParaRPr lang="de-DE"/>
           </a:p>
@@ -7458,7 +7458,7 @@
           <a:p>
             <a:fld id="{04DB4664-320F-496D-9F7E-954AAC8184AA}" type="datetimeFigureOut">
               <a:rPr lang="de-DE" smtClean="0"/>
-              <a:t>18.07.2016</a:t>
+              <a:t>25.07.2016</a:t>
             </a:fld>
             <a:endParaRPr lang="de-DE"/>
           </a:p>
@@ -7733,7 +7733,7 @@
           <a:p>
             <a:fld id="{04DB4664-320F-496D-9F7E-954AAC8184AA}" type="datetimeFigureOut">
               <a:rPr lang="de-DE" smtClean="0"/>
-              <a:t>18.07.2016</a:t>
+              <a:t>25.07.2016</a:t>
             </a:fld>
             <a:endParaRPr lang="de-DE"/>
           </a:p>
@@ -7985,7 +7985,7 @@
           <a:p>
             <a:fld id="{04DB4664-320F-496D-9F7E-954AAC8184AA}" type="datetimeFigureOut">
               <a:rPr lang="de-DE" smtClean="0"/>
-              <a:t>18.07.2016</a:t>
+              <a:t>25.07.2016</a:t>
             </a:fld>
             <a:endParaRPr lang="de-DE"/>
           </a:p>
@@ -8196,7 +8196,7 @@
           <a:p>
             <a:fld id="{04DB4664-320F-496D-9F7E-954AAC8184AA}" type="datetimeFigureOut">
               <a:rPr lang="de-DE" smtClean="0"/>
-              <a:t>18.07.2016</a:t>
+              <a:t>25.07.2016</a:t>
             </a:fld>
             <a:endParaRPr lang="de-DE"/>
           </a:p>
@@ -9286,6 +9286,20 @@
             </a:r>
           </a:p>
           <a:p>
+            <a:pPr lvl="1"/>
+            <a:r>
+              <a:rPr lang="de-DE" dirty="0"/>
+              <a:t>Tatsächliche Zeit </a:t>
+            </a:r>
+            <a:r>
+              <a:rPr lang="de-DE" dirty="0">
+                <a:sym typeface="Wingdings" panose="05000000000000000000" pitchFamily="2" charset="2"/>
+              </a:rPr>
+              <a:t> Enddatum / Soll – Ist Vergleich</a:t>
+            </a:r>
+            <a:endParaRPr lang="de-DE" dirty="0"/>
+          </a:p>
+          <a:p>
             <a:r>
               <a:rPr lang="de-DE" dirty="0"/>
               <a:t>Fortschritt -&gt; Projektleiter pflegt händisch den Fortschritt</a:t>

</xml_diff>